<commit_message>
add reflections to pptx
</commit_message>
<xml_diff>
--- a/model.pptx
+++ b/model.pptx
@@ -19,6 +19,7 @@
     <p:sldId id="264" r:id="rId13"/>
     <p:sldId id="268" r:id="rId14"/>
     <p:sldId id="269" r:id="rId15"/>
+    <p:sldId id="270" r:id="rId16"/>
   </p:sldIdLst>
   <p:sldSz cx="12192000" cy="6858000"/>
   <p:notesSz cx="6858000" cy="9144000"/>
@@ -5130,6 +5131,198 @@
 </p:sld>
 </file>
 
+<file path=ppt/slides/slide15.xml><?xml version="1.0" encoding="utf-8"?>
+<p:sld xmlns:a="http://schemas.openxmlformats.org/drawingml/2006/main" xmlns:r="http://schemas.openxmlformats.org/officeDocument/2006/relationships" xmlns:p="http://schemas.openxmlformats.org/presentationml/2006/main">
+  <p:cSld>
+    <p:spTree>
+      <p:nvGrpSpPr>
+        <p:cNvPr id="1" name=""/>
+        <p:cNvGrpSpPr/>
+        <p:nvPr/>
+      </p:nvGrpSpPr>
+      <p:grpSpPr>
+        <a:xfrm>
+          <a:off x="0" y="0"/>
+          <a:ext cx="0" cy="0"/>
+          <a:chOff x="0" y="0"/>
+          <a:chExt cx="0" cy="0"/>
+        </a:xfrm>
+      </p:grpSpPr>
+      <p:sp>
+        <p:nvSpPr>
+          <p:cNvPr id="2" name="Title 1"/>
+          <p:cNvSpPr>
+            <a:spLocks noGrp="1"/>
+          </p:cNvSpPr>
+          <p:nvPr>
+            <p:ph type="title"/>
+          </p:nvPr>
+        </p:nvSpPr>
+        <p:spPr/>
+        <p:txBody>
+          <a:bodyPr/>
+          <a:lstStyle/>
+          <a:p>
+            <a:r>
+              <a:rPr lang="en-US" dirty="0" smtClean="0"/>
+              <a:t>Reflections</a:t>
+            </a:r>
+            <a:endParaRPr lang="en-US" dirty="0"/>
+          </a:p>
+        </p:txBody>
+      </p:sp>
+      <p:sp>
+        <p:nvSpPr>
+          <p:cNvPr id="3" name="Content Placeholder 2"/>
+          <p:cNvSpPr>
+            <a:spLocks noGrp="1"/>
+          </p:cNvSpPr>
+          <p:nvPr>
+            <p:ph idx="1"/>
+          </p:nvPr>
+        </p:nvSpPr>
+        <p:spPr>
+          <a:xfrm>
+            <a:off x="374573" y="1046601"/>
+            <a:ext cx="10979227" cy="5673688"/>
+          </a:xfrm>
+        </p:spPr>
+        <p:txBody>
+          <a:bodyPr>
+            <a:normAutofit/>
+          </a:bodyPr>
+          <a:lstStyle/>
+          <a:p>
+            <a:pPr marL="0" indent="0">
+              <a:buNone/>
+            </a:pPr>
+            <a:r>
+              <a:rPr lang="en-US" sz="1800" i="1" dirty="0" smtClean="0">
+                <a:solidFill>
+                  <a:srgbClr val="92D050"/>
+                </a:solidFill>
+              </a:rPr>
+              <a:t>Strengths</a:t>
+            </a:r>
+          </a:p>
+          <a:p>
+            <a:r>
+              <a:rPr lang="en-US" sz="1800" dirty="0" smtClean="0"/>
+              <a:t>Depth of functionality</a:t>
+            </a:r>
+          </a:p>
+          <a:p>
+            <a:r>
+              <a:rPr lang="en-US" sz="1800" dirty="0" smtClean="0"/>
+              <a:t>Robust</a:t>
+            </a:r>
+          </a:p>
+          <a:p>
+            <a:r>
+              <a:rPr lang="en-US" sz="1800" dirty="0" smtClean="0"/>
+              <a:t>Object-oriented approach makes for easy scaling</a:t>
+            </a:r>
+          </a:p>
+          <a:p>
+            <a:r>
+              <a:rPr lang="en-US" sz="1800" dirty="0" smtClean="0"/>
+              <a:t>Graphics!</a:t>
+            </a:r>
+          </a:p>
+          <a:p>
+            <a:pPr marL="0" indent="0">
+              <a:buNone/>
+            </a:pPr>
+            <a:r>
+              <a:rPr lang="en-US" sz="1800" i="1" dirty="0" smtClean="0">
+                <a:solidFill>
+                  <a:srgbClr val="92D050"/>
+                </a:solidFill>
+              </a:rPr>
+              <a:t>Weaknesses</a:t>
+            </a:r>
+          </a:p>
+          <a:p>
+            <a:r>
+              <a:rPr lang="en-US" sz="1800" dirty="0" smtClean="0"/>
+              <a:t>Scaling artifacts &amp; retrofits</a:t>
+            </a:r>
+          </a:p>
+          <a:p>
+            <a:r>
+              <a:rPr lang="en-US" sz="1800" dirty="0" smtClean="0"/>
+              <a:t>Class organization</a:t>
+            </a:r>
+          </a:p>
+          <a:p>
+            <a:r>
+              <a:rPr lang="en-US" sz="1800" dirty="0" smtClean="0"/>
+              <a:t>Resistance to misuse</a:t>
+            </a:r>
+          </a:p>
+          <a:p>
+            <a:r>
+              <a:rPr lang="en-US" sz="1800" dirty="0" smtClean="0"/>
+              <a:t>Single author architecture</a:t>
+            </a:r>
+          </a:p>
+          <a:p>
+            <a:pPr marL="0" indent="0">
+              <a:buNone/>
+            </a:pPr>
+            <a:r>
+              <a:rPr lang="en-US" sz="1800" i="1" dirty="0" smtClean="0">
+                <a:solidFill>
+                  <a:srgbClr val="92D050"/>
+                </a:solidFill>
+              </a:rPr>
+              <a:t>Lessons</a:t>
+            </a:r>
+          </a:p>
+          <a:p>
+            <a:r>
+              <a:rPr lang="en-US" sz="1800" dirty="0" smtClean="0"/>
+              <a:t>Importance of planning for scalability, flexibility, agility, and </a:t>
+            </a:r>
+            <a:r>
+              <a:rPr lang="en-US" sz="1800" dirty="0" err="1" smtClean="0"/>
+              <a:t>integrability</a:t>
+            </a:r>
+            <a:endParaRPr lang="en-US" sz="1800" dirty="0" smtClean="0"/>
+          </a:p>
+          <a:p>
+            <a:r>
+              <a:rPr lang="en-US" sz="1800" dirty="0" smtClean="0"/>
+              <a:t>Importance of regular, rigorous, systematic testing</a:t>
+            </a:r>
+          </a:p>
+          <a:p>
+            <a:r>
+              <a:rPr lang="en-US" sz="1800" dirty="0" smtClean="0"/>
+              <a:t>Importance of regular reflection, review, and revision</a:t>
+            </a:r>
+          </a:p>
+          <a:p>
+            <a:r>
+              <a:rPr lang="en-US" sz="1800" dirty="0" smtClean="0"/>
+              <a:t>Importance of collaboration, creativity, and approach diversity</a:t>
+            </a:r>
+          </a:p>
+        </p:txBody>
+      </p:sp>
+    </p:spTree>
+    <p:extLst>
+      <p:ext uri="{BB962C8B-B14F-4D97-AF65-F5344CB8AC3E}">
+        <p14:creationId xmlns:p14="http://schemas.microsoft.com/office/powerpoint/2010/main" val="1751032671"/>
+      </p:ext>
+    </p:extLst>
+  </p:cSld>
+  <p:clrMapOvr>
+    <a:masterClrMapping/>
+  </p:clrMapOvr>
+</p:sld>
+</file>
+
 <file path=ppt/slides/slide2.xml><?xml version="1.0" encoding="utf-8"?>
 <p:sld xmlns:a="http://schemas.openxmlformats.org/drawingml/2006/main" xmlns:r="http://schemas.openxmlformats.org/officeDocument/2006/relationships" xmlns:p="http://schemas.openxmlformats.org/presentationml/2006/main">
   <p:cSld>
@@ -6767,13 +6960,7 @@
               <a:rPr lang="en-US" sz="1700" dirty="0" smtClean="0">
                 <a:latin typeface="Consolas" panose="020B0609020204030204" pitchFamily="49" charset="0"/>
               </a:rPr>
-              <a:t>string </a:t>
-            </a:r>
-            <a:r>
-              <a:rPr lang="en-US" sz="1700" dirty="0" smtClean="0">
-                <a:latin typeface="Consolas" panose="020B0609020204030204" pitchFamily="49" charset="0"/>
-              </a:rPr>
-              <a:t>name</a:t>
+              <a:t>string name</a:t>
             </a:r>
           </a:p>
           <a:p>
@@ -6798,13 +6985,21 @@
               <a:rPr lang="en-US" sz="1700" dirty="0" smtClean="0">
                 <a:latin typeface="Consolas" panose="020B0609020204030204" pitchFamily="49" charset="0"/>
               </a:rPr>
-              <a:t>string </a:t>
+              <a:t>string color</a:t>
+            </a:r>
+          </a:p>
+          <a:p>
+            <a:r>
+              <a:rPr lang="en-US" sz="1700" dirty="0" err="1" smtClean="0">
+                <a:latin typeface="Consolas" panose="020B0609020204030204" pitchFamily="49" charset="0"/>
+              </a:rPr>
+              <a:t>int</a:t>
             </a:r>
             <a:r>
               <a:rPr lang="en-US" sz="1700" dirty="0" smtClean="0">
                 <a:latin typeface="Consolas" panose="020B0609020204030204" pitchFamily="49" charset="0"/>
               </a:rPr>
-              <a:t>color</a:t>
+              <a:t> position</a:t>
             </a:r>
           </a:p>
           <a:p>
@@ -6818,33 +7013,7 @@
               <a:rPr lang="en-US" sz="1700" dirty="0" smtClean="0">
                 <a:latin typeface="Consolas" panose="020B0609020204030204" pitchFamily="49" charset="0"/>
               </a:rPr>
-              <a:t> </a:t>
-            </a:r>
-            <a:r>
-              <a:rPr lang="en-US" sz="1700" dirty="0" smtClean="0">
-                <a:latin typeface="Consolas" panose="020B0609020204030204" pitchFamily="49" charset="0"/>
-              </a:rPr>
-              <a:t>position</a:t>
-            </a:r>
-          </a:p>
-          <a:p>
-            <a:r>
-              <a:rPr lang="en-US" sz="1700" dirty="0" err="1" smtClean="0">
-                <a:latin typeface="Consolas" panose="020B0609020204030204" pitchFamily="49" charset="0"/>
-              </a:rPr>
-              <a:t>int</a:t>
-            </a:r>
-            <a:r>
-              <a:rPr lang="en-US" sz="1700" dirty="0" smtClean="0">
-                <a:latin typeface="Consolas" panose="020B0609020204030204" pitchFamily="49" charset="0"/>
-              </a:rPr>
-              <a:t> </a:t>
-            </a:r>
-            <a:r>
-              <a:rPr lang="en-US" sz="1700" dirty="0" smtClean="0">
-                <a:latin typeface="Consolas" panose="020B0609020204030204" pitchFamily="49" charset="0"/>
-              </a:rPr>
-              <a:t>price</a:t>
+              <a:t> price</a:t>
             </a:r>
           </a:p>
           <a:p>
@@ -6904,13 +7073,7 @@
               <a:rPr lang="en-US" sz="1700" dirty="0" smtClean="0">
                 <a:latin typeface="Consolas" panose="020B0609020204030204" pitchFamily="49" charset="0"/>
               </a:rPr>
-              <a:t>[6</a:t>
-            </a:r>
-            <a:r>
-              <a:rPr lang="en-US" sz="1700" dirty="0" smtClean="0">
-                <a:latin typeface="Consolas" panose="020B0609020204030204" pitchFamily="49" charset="0"/>
-              </a:rPr>
-              <a:t>] rent</a:t>
+              <a:t>[6] rent</a:t>
             </a:r>
           </a:p>
           <a:p>
@@ -6975,13 +7138,7 @@
               <a:rPr lang="en-US" sz="1700" dirty="0" smtClean="0">
                 <a:latin typeface="Consolas" panose="020B0609020204030204" pitchFamily="49" charset="0"/>
               </a:rPr>
-              <a:t>Player </a:t>
-            </a:r>
-            <a:r>
-              <a:rPr lang="en-US" sz="1700" dirty="0" smtClean="0">
-                <a:latin typeface="Consolas" panose="020B0609020204030204" pitchFamily="49" charset="0"/>
-              </a:rPr>
-              <a:t>owner</a:t>
+              <a:t>Player owner</a:t>
             </a:r>
           </a:p>
         </p:txBody>
@@ -7221,27 +7378,15 @@
               <a:rPr lang="en-US" sz="1600" dirty="0" smtClean="0">
                 <a:latin typeface="Consolas" panose="020B0609020204030204" pitchFamily="49" charset="0"/>
               </a:rPr>
-              <a:t>sets</a:t>
-            </a:r>
+              <a:t>sets()</a:t>
+            </a:r>
+          </a:p>
+          <a:p>
             <a:r>
               <a:rPr lang="en-US" sz="1600" dirty="0" smtClean="0">
                 <a:latin typeface="Consolas" panose="020B0609020204030204" pitchFamily="49" charset="0"/>
               </a:rPr>
-              <a:t>()</a:t>
-            </a:r>
-          </a:p>
-          <a:p>
-            <a:r>
-              <a:rPr lang="en-US" sz="1600" dirty="0" smtClean="0">
-                <a:latin typeface="Consolas" panose="020B0609020204030204" pitchFamily="49" charset="0"/>
-              </a:rPr>
-              <a:t>gets</a:t>
-            </a:r>
-            <a:r>
-              <a:rPr lang="en-US" sz="1600" dirty="0" smtClean="0">
-                <a:latin typeface="Consolas" panose="020B0609020204030204" pitchFamily="49" charset="0"/>
-              </a:rPr>
-              <a:t>()</a:t>
+              <a:t>gets()</a:t>
             </a:r>
           </a:p>
           <a:p>
@@ -9283,11 +9428,6 @@
               </a:rPr>
               <a:t>Methods (continued)</a:t>
             </a:r>
-            <a:endParaRPr lang="en-US" sz="1900" i="1" dirty="0" smtClean="0">
-              <a:solidFill>
-                <a:srgbClr val="92D050"/>
-              </a:solidFill>
-            </a:endParaRPr>
           </a:p>
           <a:p>
             <a:r>
@@ -10043,13 +10183,15 @@
               <a:rPr lang="en-US" sz="1600" dirty="0" smtClean="0">
                 <a:latin typeface="Consolas" panose="020B0609020204030204" pitchFamily="49" charset="0"/>
               </a:rPr>
-              <a:t>string </a:t>
-            </a:r>
+              <a:t>string tag</a:t>
+            </a:r>
+          </a:p>
+          <a:p>
             <a:r>
               <a:rPr lang="en-US" sz="1600" dirty="0" smtClean="0">
                 <a:latin typeface="Consolas" panose="020B0609020204030204" pitchFamily="49" charset="0"/>
               </a:rPr>
-              <a:t>tag</a:t>
+              <a:t>string type</a:t>
             </a:r>
           </a:p>
           <a:p>
@@ -10057,13 +10199,15 @@
               <a:rPr lang="en-US" sz="1600" dirty="0" smtClean="0">
                 <a:latin typeface="Consolas" panose="020B0609020204030204" pitchFamily="49" charset="0"/>
               </a:rPr>
-              <a:t>string </a:t>
-            </a:r>
+              <a:t>string category</a:t>
+            </a:r>
+          </a:p>
+          <a:p>
             <a:r>
               <a:rPr lang="en-US" sz="1600" dirty="0" smtClean="0">
                 <a:latin typeface="Consolas" panose="020B0609020204030204" pitchFamily="49" charset="0"/>
               </a:rPr>
-              <a:t>type</a:t>
+              <a:t>string name</a:t>
             </a:r>
           </a:p>
           <a:p>
@@ -10071,41 +10215,7 @@
               <a:rPr lang="en-US" sz="1600" dirty="0" smtClean="0">
                 <a:latin typeface="Consolas" panose="020B0609020204030204" pitchFamily="49" charset="0"/>
               </a:rPr>
-              <a:t>string </a:t>
-            </a:r>
-            <a:r>
-              <a:rPr lang="en-US" sz="1600" dirty="0" smtClean="0">
-                <a:latin typeface="Consolas" panose="020B0609020204030204" pitchFamily="49" charset="0"/>
-              </a:rPr>
-              <a:t>category</a:t>
-            </a:r>
-          </a:p>
-          <a:p>
-            <a:r>
-              <a:rPr lang="en-US" sz="1600" dirty="0" smtClean="0">
-                <a:latin typeface="Consolas" panose="020B0609020204030204" pitchFamily="49" charset="0"/>
-              </a:rPr>
-              <a:t>string </a:t>
-            </a:r>
-            <a:r>
-              <a:rPr lang="en-US" sz="1600" dirty="0" smtClean="0">
-                <a:latin typeface="Consolas" panose="020B0609020204030204" pitchFamily="49" charset="0"/>
-              </a:rPr>
-              <a:t>name</a:t>
-            </a:r>
-          </a:p>
-          <a:p>
-            <a:r>
-              <a:rPr lang="en-US" sz="1600" dirty="0" smtClean="0">
-                <a:latin typeface="Consolas" panose="020B0609020204030204" pitchFamily="49" charset="0"/>
-              </a:rPr>
-              <a:t>string </a:t>
-            </a:r>
-            <a:r>
-              <a:rPr lang="en-US" sz="1600" dirty="0" smtClean="0">
-                <a:latin typeface="Consolas" panose="020B0609020204030204" pitchFamily="49" charset="0"/>
-              </a:rPr>
-              <a:t>description</a:t>
+              <a:t>string description</a:t>
             </a:r>
           </a:p>
           <a:p>
@@ -10400,7 +10510,6 @@
               <a:rPr lang="en-US" sz="1900" dirty="0" smtClean="0"/>
               <a:t>), </a:t>
             </a:r>
-            <a:endParaRPr lang="en-US" sz="1900" dirty="0" smtClean="0"/>
           </a:p>
           <a:p>
             <a:pPr lvl="1"/>
@@ -10424,17 +10533,12 @@
               <a:rPr lang="en-US" sz="1900" dirty="0" smtClean="0"/>
               <a:t>, </a:t>
             </a:r>
-            <a:endParaRPr lang="en-US" sz="1900" dirty="0" smtClean="0"/>
           </a:p>
           <a:p>
             <a:pPr lvl="1"/>
             <a:r>
               <a:rPr lang="en-US" sz="1900" dirty="0" smtClean="0"/>
-              <a:t>graphics </a:t>
-            </a:r>
-            <a:r>
-              <a:rPr lang="en-US" sz="1900" dirty="0" smtClean="0"/>
-              <a:t>(string[] </a:t>
+              <a:t>graphics (string[] </a:t>
             </a:r>
             <a:r>
               <a:rPr lang="en-US" sz="1900" dirty="0" err="1" smtClean="0"/>
@@ -10442,23 +10546,14 @@
             </a:r>
             <a:r>
               <a:rPr lang="en-US" sz="1900" dirty="0" smtClean="0"/>
-              <a:t>), </a:t>
-            </a:r>
+              <a:t>), and </a:t>
+            </a:r>
+          </a:p>
+          <a:p>
+            <a:pPr lvl="1"/>
             <a:r>
               <a:rPr lang="en-US" sz="1900" dirty="0" smtClean="0"/>
-              <a:t>and </a:t>
-            </a:r>
-            <a:endParaRPr lang="en-US" sz="1900" dirty="0" smtClean="0"/>
-          </a:p>
-          <a:p>
-            <a:pPr lvl="1"/>
-            <a:r>
-              <a:rPr lang="en-US" sz="1900" dirty="0" smtClean="0"/>
-              <a:t>graphics </a:t>
-            </a:r>
-            <a:r>
-              <a:rPr lang="en-US" sz="1900" dirty="0" smtClean="0"/>
-              <a:t>indices </a:t>
+              <a:t>graphics indices </a:t>
             </a:r>
             <a:r>
               <a:rPr lang="en-US" sz="1900" dirty="0" smtClean="0">
@@ -10603,13 +10698,7 @@
               <a:rPr lang="en-US" sz="1700" dirty="0" smtClean="0">
                 <a:latin typeface="Consolas" panose="020B0609020204030204" pitchFamily="49" charset="0"/>
               </a:rPr>
-              <a:t>while </a:t>
-            </a:r>
-            <a:r>
-              <a:rPr lang="en-US" sz="1700" dirty="0" smtClean="0">
-                <a:latin typeface="Consolas" panose="020B0609020204030204" pitchFamily="49" charset="0"/>
-              </a:rPr>
-              <a:t>(</a:t>
+              <a:t>while (</a:t>
             </a:r>
             <a:r>
               <a:rPr lang="en-US" sz="1700" dirty="0" err="1" smtClean="0">
@@ -11131,13 +11220,7 @@
               <a:rPr lang="en-US" dirty="0" smtClean="0">
                 <a:latin typeface="Consolas" panose="020B0609020204030204" pitchFamily="49" charset="0"/>
               </a:rPr>
-              <a:t>: </a:t>
-            </a:r>
-            <a:r>
-              <a:rPr lang="en-US" dirty="0" smtClean="0">
-                <a:latin typeface="Consolas" panose="020B0609020204030204" pitchFamily="49" charset="0"/>
-              </a:rPr>
-              <a:t>declare</a:t>
+              <a:t>: declare</a:t>
             </a:r>
             <a:r>
               <a:rPr lang="en-US" dirty="0" smtClean="0"/>
@@ -11457,13 +11540,7 @@
               <a:rPr lang="en-US" dirty="0" smtClean="0">
                 <a:latin typeface="Consolas" panose="020B0609020204030204" pitchFamily="49" charset="0"/>
               </a:rPr>
-              <a:t>List&lt;Property&gt; </a:t>
-            </a:r>
-            <a:r>
-              <a:rPr lang="en-US" dirty="0" smtClean="0">
-                <a:latin typeface="Consolas" panose="020B0609020204030204" pitchFamily="49" charset="0"/>
-              </a:rPr>
-              <a:t>board</a:t>
+              <a:t>List&lt;Property&gt; board</a:t>
             </a:r>
             <a:endParaRPr lang="en-US" dirty="0">
               <a:latin typeface="Consolas" panose="020B0609020204030204" pitchFamily="49" charset="0"/>
@@ -11902,13 +11979,7 @@
               <a:rPr lang="en-US" dirty="0" smtClean="0">
                 <a:latin typeface="Consolas" panose="020B0609020204030204" pitchFamily="49" charset="0"/>
               </a:rPr>
-              <a:t>: </a:t>
-            </a:r>
-            <a:r>
-              <a:rPr lang="en-US" dirty="0" smtClean="0">
-                <a:latin typeface="Consolas" panose="020B0609020204030204" pitchFamily="49" charset="0"/>
-              </a:rPr>
-              <a:t>parse</a:t>
+              <a:t>: parse</a:t>
             </a:r>
             <a:r>
               <a:rPr lang="en-US" dirty="0" smtClean="0"/>

</xml_diff>